<commit_message>
worked on main powerpoint
</commit_message>
<xml_diff>
--- a/PowerPointSlids.pptx
+++ b/PowerPointSlids.pptx
@@ -7,7 +7,12 @@
   <p:sldIdLst>
     <p:sldId id="256" r:id="rId2"/>
     <p:sldId id="258" r:id="rId3"/>
-    <p:sldId id="257" r:id="rId4"/>
+    <p:sldId id="259" r:id="rId4"/>
+    <p:sldId id="260" r:id="rId5"/>
+    <p:sldId id="261" r:id="rId6"/>
+    <p:sldId id="262" r:id="rId7"/>
+    <p:sldId id="263" r:id="rId8"/>
+    <p:sldId id="257" r:id="rId9"/>
   </p:sldIdLst>
   <p:sldSz cx="12192000" cy="6858000"/>
   <p:notesSz cx="6858000" cy="9144000"/>
@@ -108,7 +113,7 @@
   </p:defaultTextStyle>
   <p:extLst>
     <p:ext uri="{EFAFB233-063F-42B5-8137-9DF3F51BA10A}">
-      <p15:sldGuideLst xmlns:p15="http://schemas.microsoft.com/office/powerpoint/2012/main" xmlns=""/>
+      <p15:sldGuideLst xmlns="" xmlns:p15="http://schemas.microsoft.com/office/powerpoint/2012/main"/>
     </p:ext>
   </p:extLst>
 </p:presentation>
@@ -144,7 +149,7 @@
             <a:alphaModFix amt="30000"/>
             <a:extLst>
               <a:ext uri="{28A0092B-C50C-407E-A947-70E740481C1C}">
-                <a14:useLocalDpi xmlns:a14="http://schemas.microsoft.com/office/drawing/2010/main" xmlns="" val="0"/>
+                <a14:useLocalDpi xmlns="" xmlns:a14="http://schemas.microsoft.com/office/drawing/2010/main" val="0"/>
               </a:ext>
             </a:extLst>
           </a:blip>
@@ -164,7 +169,7 @@
           <a:noFill/>
           <a:extLst>
             <a:ext uri="{909E8E84-426E-40dd-AFC4-6F175D3DCCD1}">
-              <a14:hiddenFill xmlns:a14="http://schemas.microsoft.com/office/drawing/2010/main" xmlns="">
+              <a14:hiddenFill xmlns="" xmlns:a14="http://schemas.microsoft.com/office/drawing/2010/main">
                 <a:solidFill>
                   <a:srgbClr val="FFFFFF"/>
                 </a:solidFill>
@@ -224,7 +229,7 @@
             </a:ln>
             <a:extLst>
               <a:ext uri="{91240B29-F687-4f45-9708-019B960494DF}">
-                <a14:hiddenLine xmlns:a14="http://schemas.microsoft.com/office/drawing/2010/main" xmlns="" w="9525">
+                <a14:hiddenLine xmlns="" xmlns:a14="http://schemas.microsoft.com/office/drawing/2010/main" w="9525">
                   <a:solidFill>
                     <a:srgbClr val="000000"/>
                   </a:solidFill>
@@ -314,7 +319,7 @@
             </a:ln>
             <a:extLst>
               <a:ext uri="{91240B29-F687-4f45-9708-019B960494DF}">
-                <a14:hiddenLine xmlns:a14="http://schemas.microsoft.com/office/drawing/2010/main" xmlns="" w="9525">
+                <a14:hiddenLine xmlns="" xmlns:a14="http://schemas.microsoft.com/office/drawing/2010/main" w="9525">
                   <a:solidFill>
                     <a:srgbClr val="000000"/>
                   </a:solidFill>
@@ -404,7 +409,7 @@
             </a:ln>
             <a:extLst>
               <a:ext uri="{91240B29-F687-4f45-9708-019B960494DF}">
-                <a14:hiddenLine xmlns:a14="http://schemas.microsoft.com/office/drawing/2010/main" xmlns="" w="9525">
+                <a14:hiddenLine xmlns="" xmlns:a14="http://schemas.microsoft.com/office/drawing/2010/main" w="9525">
                   <a:solidFill>
                     <a:srgbClr val="000000"/>
                   </a:solidFill>
@@ -438,7 +443,7 @@
             </a:ln>
             <a:extLst>
               <a:ext uri="{91240B29-F687-4f45-9708-019B960494DF}">
-                <a14:hiddenLine xmlns:a14="http://schemas.microsoft.com/office/drawing/2010/main" xmlns="" w="9525">
+                <a14:hiddenLine xmlns="" xmlns:a14="http://schemas.microsoft.com/office/drawing/2010/main" w="9525">
                   <a:solidFill>
                     <a:srgbClr val="000000"/>
                   </a:solidFill>
@@ -528,7 +533,7 @@
             </a:ln>
             <a:extLst>
               <a:ext uri="{91240B29-F687-4f45-9708-019B960494DF}">
-                <a14:hiddenLine xmlns:a14="http://schemas.microsoft.com/office/drawing/2010/main" xmlns="" w="9525">
+                <a14:hiddenLine xmlns="" xmlns:a14="http://schemas.microsoft.com/office/drawing/2010/main" w="9525">
                   <a:solidFill>
                     <a:srgbClr val="000000"/>
                   </a:solidFill>
@@ -590,7 +595,7 @@
             </a:ln>
             <a:extLst>
               <a:ext uri="{91240B29-F687-4f45-9708-019B960494DF}">
-                <a14:hiddenLine xmlns:a14="http://schemas.microsoft.com/office/drawing/2010/main" xmlns="" w="9525">
+                <a14:hiddenLine xmlns="" xmlns:a14="http://schemas.microsoft.com/office/drawing/2010/main" w="9525">
                   <a:solidFill>
                     <a:srgbClr val="000000"/>
                   </a:solidFill>
@@ -652,7 +657,7 @@
             </a:ln>
             <a:extLst>
               <a:ext uri="{91240B29-F687-4f45-9708-019B960494DF}">
-                <a14:hiddenLine xmlns:a14="http://schemas.microsoft.com/office/drawing/2010/main" xmlns="" w="9525">
+                <a14:hiddenLine xmlns="" xmlns:a14="http://schemas.microsoft.com/office/drawing/2010/main" w="9525">
                   <a:solidFill>
                     <a:srgbClr val="000000"/>
                   </a:solidFill>
@@ -742,7 +747,7 @@
             </a:ln>
             <a:extLst>
               <a:ext uri="{91240B29-F687-4f45-9708-019B960494DF}">
-                <a14:hiddenLine xmlns:a14="http://schemas.microsoft.com/office/drawing/2010/main" xmlns="" w="9525">
+                <a14:hiddenLine xmlns="" xmlns:a14="http://schemas.microsoft.com/office/drawing/2010/main" w="9525">
                   <a:solidFill>
                     <a:srgbClr val="000000"/>
                   </a:solidFill>
@@ -804,7 +809,7 @@
             </a:ln>
             <a:extLst>
               <a:ext uri="{91240B29-F687-4f45-9708-019B960494DF}">
-                <a14:hiddenLine xmlns:a14="http://schemas.microsoft.com/office/drawing/2010/main" xmlns="" w="9525">
+                <a14:hiddenLine xmlns="" xmlns:a14="http://schemas.microsoft.com/office/drawing/2010/main" w="9525">
                   <a:solidFill>
                     <a:srgbClr val="000000"/>
                   </a:solidFill>
@@ -866,7 +871,7 @@
             </a:ln>
             <a:extLst>
               <a:ext uri="{91240B29-F687-4f45-9708-019B960494DF}">
-                <a14:hiddenLine xmlns:a14="http://schemas.microsoft.com/office/drawing/2010/main" xmlns="" w="9525">
+                <a14:hiddenLine xmlns="" xmlns:a14="http://schemas.microsoft.com/office/drawing/2010/main" w="9525">
                   <a:solidFill>
                     <a:srgbClr val="000000"/>
                   </a:solidFill>
@@ -956,7 +961,7 @@
             </a:ln>
             <a:extLst>
               <a:ext uri="{91240B29-F687-4f45-9708-019B960494DF}">
-                <a14:hiddenLine xmlns:a14="http://schemas.microsoft.com/office/drawing/2010/main" xmlns="" w="9525">
+                <a14:hiddenLine xmlns="" xmlns:a14="http://schemas.microsoft.com/office/drawing/2010/main" w="9525">
                   <a:solidFill>
                     <a:srgbClr val="000000"/>
                   </a:solidFill>
@@ -1046,7 +1051,7 @@
             </a:ln>
             <a:extLst>
               <a:ext uri="{91240B29-F687-4f45-9708-019B960494DF}">
-                <a14:hiddenLine xmlns:a14="http://schemas.microsoft.com/office/drawing/2010/main" xmlns="" w="9525">
+                <a14:hiddenLine xmlns="" xmlns:a14="http://schemas.microsoft.com/office/drawing/2010/main" w="9525">
                   <a:solidFill>
                     <a:srgbClr val="000000"/>
                   </a:solidFill>
@@ -1108,7 +1113,7 @@
             </a:ln>
             <a:extLst>
               <a:ext uri="{91240B29-F687-4f45-9708-019B960494DF}">
-                <a14:hiddenLine xmlns:a14="http://schemas.microsoft.com/office/drawing/2010/main" xmlns="" w="9525">
+                <a14:hiddenLine xmlns="" xmlns:a14="http://schemas.microsoft.com/office/drawing/2010/main" w="9525">
                   <a:solidFill>
                     <a:srgbClr val="000000"/>
                   </a:solidFill>
@@ -1218,7 +1223,7 @@
             </a:ln>
             <a:extLst>
               <a:ext uri="{91240B29-F687-4f45-9708-019B960494DF}">
-                <a14:hiddenLine xmlns:a14="http://schemas.microsoft.com/office/drawing/2010/main" xmlns="" w="9525">
+                <a14:hiddenLine xmlns="" xmlns:a14="http://schemas.microsoft.com/office/drawing/2010/main" w="9525">
                   <a:solidFill>
                     <a:srgbClr val="000000"/>
                   </a:solidFill>
@@ -1280,7 +1285,7 @@
             </a:ln>
             <a:extLst>
               <a:ext uri="{91240B29-F687-4f45-9708-019B960494DF}">
-                <a14:hiddenLine xmlns:a14="http://schemas.microsoft.com/office/drawing/2010/main" xmlns="" w="9525">
+                <a14:hiddenLine xmlns="" xmlns:a14="http://schemas.microsoft.com/office/drawing/2010/main" w="9525">
                   <a:solidFill>
                     <a:srgbClr val="000000"/>
                   </a:solidFill>
@@ -1370,7 +1375,7 @@
             </a:ln>
             <a:extLst>
               <a:ext uri="{91240B29-F687-4f45-9708-019B960494DF}">
-                <a14:hiddenLine xmlns:a14="http://schemas.microsoft.com/office/drawing/2010/main" xmlns="" w="9525">
+                <a14:hiddenLine xmlns="" xmlns:a14="http://schemas.microsoft.com/office/drawing/2010/main" w="9525">
                   <a:solidFill>
                     <a:srgbClr val="000000"/>
                   </a:solidFill>
@@ -1460,7 +1465,7 @@
             </a:ln>
             <a:extLst>
               <a:ext uri="{91240B29-F687-4f45-9708-019B960494DF}">
-                <a14:hiddenLine xmlns:a14="http://schemas.microsoft.com/office/drawing/2010/main" xmlns="" w="9525">
+                <a14:hiddenLine xmlns="" xmlns:a14="http://schemas.microsoft.com/office/drawing/2010/main" w="9525">
                   <a:solidFill>
                     <a:srgbClr val="000000"/>
                   </a:solidFill>
@@ -1522,7 +1527,7 @@
             </a:ln>
             <a:extLst>
               <a:ext uri="{91240B29-F687-4f45-9708-019B960494DF}">
-                <a14:hiddenLine xmlns:a14="http://schemas.microsoft.com/office/drawing/2010/main" xmlns="" w="9525">
+                <a14:hiddenLine xmlns="" xmlns:a14="http://schemas.microsoft.com/office/drawing/2010/main" w="9525">
                   <a:solidFill>
                     <a:srgbClr val="000000"/>
                   </a:solidFill>
@@ -1612,7 +1617,7 @@
             </a:ln>
             <a:extLst>
               <a:ext uri="{91240B29-F687-4f45-9708-019B960494DF}">
-                <a14:hiddenLine xmlns:a14="http://schemas.microsoft.com/office/drawing/2010/main" xmlns="" w="9525">
+                <a14:hiddenLine xmlns="" xmlns:a14="http://schemas.microsoft.com/office/drawing/2010/main" w="9525">
                   <a:solidFill>
                     <a:srgbClr val="000000"/>
                   </a:solidFill>
@@ -1702,7 +1707,7 @@
             </a:ln>
             <a:extLst>
               <a:ext uri="{91240B29-F687-4f45-9708-019B960494DF}">
-                <a14:hiddenLine xmlns:a14="http://schemas.microsoft.com/office/drawing/2010/main" xmlns="" w="9525">
+                <a14:hiddenLine xmlns="" xmlns:a14="http://schemas.microsoft.com/office/drawing/2010/main" w="9525">
                   <a:solidFill>
                     <a:srgbClr val="000000"/>
                   </a:solidFill>
@@ -1758,7 +1763,7 @@
             </a:ln>
             <a:extLst>
               <a:ext uri="{91240B29-F687-4f45-9708-019B960494DF}">
-                <a14:hiddenLine xmlns:a14="http://schemas.microsoft.com/office/drawing/2010/main" xmlns="" w="9525">
+                <a14:hiddenLine xmlns="" xmlns:a14="http://schemas.microsoft.com/office/drawing/2010/main" w="9525">
                   <a:solidFill>
                     <a:srgbClr val="000000"/>
                   </a:solidFill>
@@ -1848,7 +1853,7 @@
             </a:ln>
             <a:extLst>
               <a:ext uri="{91240B29-F687-4f45-9708-019B960494DF}">
-                <a14:hiddenLine xmlns:a14="http://schemas.microsoft.com/office/drawing/2010/main" xmlns="" w="9525">
+                <a14:hiddenLine xmlns="" xmlns:a14="http://schemas.microsoft.com/office/drawing/2010/main" w="9525">
                   <a:solidFill>
                     <a:srgbClr val="000000"/>
                   </a:solidFill>
@@ -1904,7 +1909,7 @@
             </a:ln>
             <a:extLst>
               <a:ext uri="{91240B29-F687-4f45-9708-019B960494DF}">
-                <a14:hiddenLine xmlns:a14="http://schemas.microsoft.com/office/drawing/2010/main" xmlns="" w="9525">
+                <a14:hiddenLine xmlns="" xmlns:a14="http://schemas.microsoft.com/office/drawing/2010/main" w="9525">
                   <a:solidFill>
                     <a:srgbClr val="000000"/>
                   </a:solidFill>
@@ -1994,7 +1999,7 @@
             </a:ln>
             <a:extLst>
               <a:ext uri="{91240B29-F687-4f45-9708-019B960494DF}">
-                <a14:hiddenLine xmlns:a14="http://schemas.microsoft.com/office/drawing/2010/main" xmlns="" w="9525">
+                <a14:hiddenLine xmlns="" xmlns:a14="http://schemas.microsoft.com/office/drawing/2010/main" w="9525">
                   <a:solidFill>
                     <a:srgbClr val="000000"/>
                   </a:solidFill>
@@ -2062,7 +2067,7 @@
             </a:ln>
             <a:extLst>
               <a:ext uri="{91240B29-F687-4f45-9708-019B960494DF}">
-                <a14:hiddenLine xmlns:a14="http://schemas.microsoft.com/office/drawing/2010/main" xmlns="" w="9525">
+                <a14:hiddenLine xmlns="" xmlns:a14="http://schemas.microsoft.com/office/drawing/2010/main" w="9525">
                   <a:solidFill>
                     <a:srgbClr val="000000"/>
                   </a:solidFill>
@@ -2152,7 +2157,7 @@
             </a:ln>
             <a:extLst>
               <a:ext uri="{91240B29-F687-4f45-9708-019B960494DF}">
-                <a14:hiddenLine xmlns:a14="http://schemas.microsoft.com/office/drawing/2010/main" xmlns="" w="9525">
+                <a14:hiddenLine xmlns="" xmlns:a14="http://schemas.microsoft.com/office/drawing/2010/main" w="9525">
                   <a:solidFill>
                     <a:srgbClr val="000000"/>
                   </a:solidFill>
@@ -2220,7 +2225,7 @@
             </a:ln>
             <a:extLst>
               <a:ext uri="{91240B29-F687-4f45-9708-019B960494DF}">
-                <a14:hiddenLine xmlns:a14="http://schemas.microsoft.com/office/drawing/2010/main" xmlns="" w="9525">
+                <a14:hiddenLine xmlns="" xmlns:a14="http://schemas.microsoft.com/office/drawing/2010/main" w="9525">
                   <a:solidFill>
                     <a:srgbClr val="000000"/>
                   </a:solidFill>
@@ -2310,7 +2315,7 @@
             </a:ln>
             <a:extLst>
               <a:ext uri="{91240B29-F687-4f45-9708-019B960494DF}">
-                <a14:hiddenLine xmlns:a14="http://schemas.microsoft.com/office/drawing/2010/main" xmlns="" w="9525">
+                <a14:hiddenLine xmlns="" xmlns:a14="http://schemas.microsoft.com/office/drawing/2010/main" w="9525">
                   <a:solidFill>
                     <a:srgbClr val="000000"/>
                   </a:solidFill>
@@ -2344,7 +2349,7 @@
             </a:ln>
             <a:extLst>
               <a:ext uri="{91240B29-F687-4f45-9708-019B960494DF}">
-                <a14:hiddenLine xmlns:a14="http://schemas.microsoft.com/office/drawing/2010/main" xmlns="" w="9525">
+                <a14:hiddenLine xmlns="" xmlns:a14="http://schemas.microsoft.com/office/drawing/2010/main" w="9525">
                   <a:solidFill>
                     <a:srgbClr val="000000"/>
                   </a:solidFill>
@@ -2434,7 +2439,7 @@
             </a:ln>
             <a:extLst>
               <a:ext uri="{91240B29-F687-4f45-9708-019B960494DF}">
-                <a14:hiddenLine xmlns:a14="http://schemas.microsoft.com/office/drawing/2010/main" xmlns="" w="9525">
+                <a14:hiddenLine xmlns="" xmlns:a14="http://schemas.microsoft.com/office/drawing/2010/main" w="9525">
                   <a:solidFill>
                     <a:srgbClr val="000000"/>
                   </a:solidFill>
@@ -2496,7 +2501,7 @@
             </a:ln>
             <a:extLst>
               <a:ext uri="{91240B29-F687-4f45-9708-019B960494DF}">
-                <a14:hiddenLine xmlns:a14="http://schemas.microsoft.com/office/drawing/2010/main" xmlns="" w="9525">
+                <a14:hiddenLine xmlns="" xmlns:a14="http://schemas.microsoft.com/office/drawing/2010/main" w="9525">
                   <a:solidFill>
                     <a:srgbClr val="000000"/>
                   </a:solidFill>
@@ -2558,7 +2563,7 @@
             </a:ln>
             <a:extLst>
               <a:ext uri="{91240B29-F687-4f45-9708-019B960494DF}">
-                <a14:hiddenLine xmlns:a14="http://schemas.microsoft.com/office/drawing/2010/main" xmlns="" w="9525">
+                <a14:hiddenLine xmlns="" xmlns:a14="http://schemas.microsoft.com/office/drawing/2010/main" w="9525">
                   <a:solidFill>
                     <a:srgbClr val="000000"/>
                   </a:solidFill>
@@ -2648,7 +2653,7 @@
             </a:ln>
             <a:extLst>
               <a:ext uri="{91240B29-F687-4f45-9708-019B960494DF}">
-                <a14:hiddenLine xmlns:a14="http://schemas.microsoft.com/office/drawing/2010/main" xmlns="" w="9525">
+                <a14:hiddenLine xmlns="" xmlns:a14="http://schemas.microsoft.com/office/drawing/2010/main" w="9525">
                   <a:solidFill>
                     <a:srgbClr val="000000"/>
                   </a:solidFill>
@@ -2716,7 +2721,7 @@
             </a:ln>
             <a:extLst>
               <a:ext uri="{91240B29-F687-4f45-9708-019B960494DF}">
-                <a14:hiddenLine xmlns:a14="http://schemas.microsoft.com/office/drawing/2010/main" xmlns="" w="9525">
+                <a14:hiddenLine xmlns="" xmlns:a14="http://schemas.microsoft.com/office/drawing/2010/main" w="9525">
                   <a:solidFill>
                     <a:srgbClr val="000000"/>
                   </a:solidFill>
@@ -2778,7 +2783,7 @@
             </a:ln>
             <a:extLst>
               <a:ext uri="{91240B29-F687-4f45-9708-019B960494DF}">
-                <a14:hiddenLine xmlns:a14="http://schemas.microsoft.com/office/drawing/2010/main" xmlns="" w="9525">
+                <a14:hiddenLine xmlns="" xmlns:a14="http://schemas.microsoft.com/office/drawing/2010/main" w="9525">
                   <a:solidFill>
                     <a:srgbClr val="000000"/>
                   </a:solidFill>
@@ -2868,7 +2873,7 @@
             </a:ln>
             <a:extLst>
               <a:ext uri="{91240B29-F687-4f45-9708-019B960494DF}">
-                <a14:hiddenLine xmlns:a14="http://schemas.microsoft.com/office/drawing/2010/main" xmlns="" w="9525">
+                <a14:hiddenLine xmlns="" xmlns:a14="http://schemas.microsoft.com/office/drawing/2010/main" w="9525">
                   <a:solidFill>
                     <a:srgbClr val="000000"/>
                   </a:solidFill>
@@ -2930,7 +2935,7 @@
             </a:ln>
             <a:extLst>
               <a:ext uri="{91240B29-F687-4f45-9708-019B960494DF}">
-                <a14:hiddenLine xmlns:a14="http://schemas.microsoft.com/office/drawing/2010/main" xmlns="" w="9525">
+                <a14:hiddenLine xmlns="" xmlns:a14="http://schemas.microsoft.com/office/drawing/2010/main" w="9525">
                   <a:solidFill>
                     <a:srgbClr val="000000"/>
                   </a:solidFill>
@@ -3020,7 +3025,7 @@
             </a:ln>
             <a:extLst>
               <a:ext uri="{91240B29-F687-4f45-9708-019B960494DF}">
-                <a14:hiddenLine xmlns:a14="http://schemas.microsoft.com/office/drawing/2010/main" xmlns="" w="9525">
+                <a14:hiddenLine xmlns="" xmlns:a14="http://schemas.microsoft.com/office/drawing/2010/main" w="9525">
                   <a:solidFill>
                     <a:srgbClr val="000000"/>
                   </a:solidFill>
@@ -3082,7 +3087,7 @@
             </a:ln>
             <a:extLst>
               <a:ext uri="{91240B29-F687-4f45-9708-019B960494DF}">
-                <a14:hiddenLine xmlns:a14="http://schemas.microsoft.com/office/drawing/2010/main" xmlns="" w="9525">
+                <a14:hiddenLine xmlns="" xmlns:a14="http://schemas.microsoft.com/office/drawing/2010/main" w="9525">
                   <a:solidFill>
                     <a:srgbClr val="000000"/>
                   </a:solidFill>
@@ -3172,7 +3177,7 @@
             </a:ln>
             <a:extLst>
               <a:ext uri="{91240B29-F687-4f45-9708-019B960494DF}">
-                <a14:hiddenLine xmlns:a14="http://schemas.microsoft.com/office/drawing/2010/main" xmlns="" w="9525">
+                <a14:hiddenLine xmlns="" xmlns:a14="http://schemas.microsoft.com/office/drawing/2010/main" w="9525">
                   <a:solidFill>
                     <a:srgbClr val="000000"/>
                   </a:solidFill>
@@ -3206,7 +3211,7 @@
             </a:ln>
             <a:extLst>
               <a:ext uri="{91240B29-F687-4f45-9708-019B960494DF}">
-                <a14:hiddenLine xmlns:a14="http://schemas.microsoft.com/office/drawing/2010/main" xmlns="" w="9525">
+                <a14:hiddenLine xmlns="" xmlns:a14="http://schemas.microsoft.com/office/drawing/2010/main" w="9525">
                   <a:solidFill>
                     <a:srgbClr val="000000"/>
                   </a:solidFill>
@@ -3271,7 +3276,7 @@
             </a:ln>
             <a:extLst>
               <a:ext uri="{91240B29-F687-4f45-9708-019B960494DF}">
-                <a14:hiddenLine xmlns:a14="http://schemas.microsoft.com/office/drawing/2010/main" xmlns="" w="9525">
+                <a14:hiddenLine xmlns="" xmlns:a14="http://schemas.microsoft.com/office/drawing/2010/main" w="9525">
                   <a:solidFill>
                     <a:srgbClr val="000000"/>
                   </a:solidFill>
@@ -3361,7 +3366,7 @@
             </a:ln>
             <a:extLst>
               <a:ext uri="{91240B29-F687-4f45-9708-019B960494DF}">
-                <a14:hiddenLine xmlns:a14="http://schemas.microsoft.com/office/drawing/2010/main" xmlns="" w="9525">
+                <a14:hiddenLine xmlns="" xmlns:a14="http://schemas.microsoft.com/office/drawing/2010/main" w="9525">
                   <a:solidFill>
                     <a:srgbClr val="000000"/>
                   </a:solidFill>
@@ -3423,7 +3428,7 @@
             </a:ln>
             <a:extLst>
               <a:ext uri="{91240B29-F687-4f45-9708-019B960494DF}">
-                <a14:hiddenLine xmlns:a14="http://schemas.microsoft.com/office/drawing/2010/main" xmlns="" w="9525">
+                <a14:hiddenLine xmlns="" xmlns:a14="http://schemas.microsoft.com/office/drawing/2010/main" w="9525">
                   <a:solidFill>
                     <a:srgbClr val="000000"/>
                   </a:solidFill>
@@ -3513,7 +3518,7 @@
             </a:ln>
             <a:extLst>
               <a:ext uri="{91240B29-F687-4f45-9708-019B960494DF}">
-                <a14:hiddenLine xmlns:a14="http://schemas.microsoft.com/office/drawing/2010/main" xmlns="" w="9525">
+                <a14:hiddenLine xmlns="" xmlns:a14="http://schemas.microsoft.com/office/drawing/2010/main" w="9525">
                   <a:solidFill>
                     <a:srgbClr val="000000"/>
                   </a:solidFill>
@@ -3603,7 +3608,7 @@
             </a:ln>
             <a:extLst>
               <a:ext uri="{91240B29-F687-4f45-9708-019B960494DF}">
-                <a14:hiddenLine xmlns:a14="http://schemas.microsoft.com/office/drawing/2010/main" xmlns="" w="9525">
+                <a14:hiddenLine xmlns="" xmlns:a14="http://schemas.microsoft.com/office/drawing/2010/main" w="9525">
                   <a:solidFill>
                     <a:srgbClr val="000000"/>
                   </a:solidFill>
@@ -3668,7 +3673,7 @@
             </a:ln>
             <a:extLst>
               <a:ext uri="{91240B29-F687-4f45-9708-019B960494DF}">
-                <a14:hiddenLine xmlns:a14="http://schemas.microsoft.com/office/drawing/2010/main" xmlns="" w="9525">
+                <a14:hiddenLine xmlns="" xmlns:a14="http://schemas.microsoft.com/office/drawing/2010/main" w="9525">
                   <a:solidFill>
                     <a:srgbClr val="000000"/>
                   </a:solidFill>
@@ -3730,7 +3735,7 @@
             </a:ln>
             <a:extLst>
               <a:ext uri="{91240B29-F687-4f45-9708-019B960494DF}">
-                <a14:hiddenLine xmlns:a14="http://schemas.microsoft.com/office/drawing/2010/main" xmlns="" w="9525">
+                <a14:hiddenLine xmlns="" xmlns:a14="http://schemas.microsoft.com/office/drawing/2010/main" w="9525">
                   <a:solidFill>
                     <a:srgbClr val="000000"/>
                   </a:solidFill>
@@ -3820,7 +3825,7 @@
             </a:ln>
             <a:extLst>
               <a:ext uri="{91240B29-F687-4f45-9708-019B960494DF}">
-                <a14:hiddenLine xmlns:a14="http://schemas.microsoft.com/office/drawing/2010/main" xmlns="" w="9525">
+                <a14:hiddenLine xmlns="" xmlns:a14="http://schemas.microsoft.com/office/drawing/2010/main" w="9525">
                   <a:solidFill>
                     <a:srgbClr val="000000"/>
                   </a:solidFill>
@@ -3910,7 +3915,7 @@
             </a:ln>
             <a:extLst>
               <a:ext uri="{91240B29-F687-4f45-9708-019B960494DF}">
-                <a14:hiddenLine xmlns:a14="http://schemas.microsoft.com/office/drawing/2010/main" xmlns="" w="9525">
+                <a14:hiddenLine xmlns="" xmlns:a14="http://schemas.microsoft.com/office/drawing/2010/main" w="9525">
                   <a:solidFill>
                     <a:srgbClr val="000000"/>
                   </a:solidFill>
@@ -3972,7 +3977,7 @@
             </a:ln>
             <a:extLst>
               <a:ext uri="{91240B29-F687-4f45-9708-019B960494DF}">
-                <a14:hiddenLine xmlns:a14="http://schemas.microsoft.com/office/drawing/2010/main" xmlns="" w="9525">
+                <a14:hiddenLine xmlns="" xmlns:a14="http://schemas.microsoft.com/office/drawing/2010/main" w="9525">
                   <a:solidFill>
                     <a:srgbClr val="000000"/>
                   </a:solidFill>
@@ -4092,7 +4097,7 @@
             </a:ln>
             <a:extLst>
               <a:ext uri="{91240B29-F687-4f45-9708-019B960494DF}">
-                <a14:hiddenLine xmlns:a14="http://schemas.microsoft.com/office/drawing/2010/main" xmlns="" w="9525">
+                <a14:hiddenLine xmlns="" xmlns:a14="http://schemas.microsoft.com/office/drawing/2010/main" w="9525">
                   <a:solidFill>
                     <a:srgbClr val="000000"/>
                   </a:solidFill>
@@ -4160,7 +4165,7 @@
             </a:ln>
             <a:extLst>
               <a:ext uri="{91240B29-F687-4f45-9708-019B960494DF}">
-                <a14:hiddenLine xmlns:a14="http://schemas.microsoft.com/office/drawing/2010/main" xmlns="" w="9525">
+                <a14:hiddenLine xmlns="" xmlns:a14="http://schemas.microsoft.com/office/drawing/2010/main" w="9525">
                   <a:solidFill>
                     <a:srgbClr val="000000"/>
                   </a:solidFill>
@@ -4250,7 +4255,7 @@
             </a:ln>
             <a:extLst>
               <a:ext uri="{91240B29-F687-4f45-9708-019B960494DF}">
-                <a14:hiddenLine xmlns:a14="http://schemas.microsoft.com/office/drawing/2010/main" xmlns="" w="9525">
+                <a14:hiddenLine xmlns="" xmlns:a14="http://schemas.microsoft.com/office/drawing/2010/main" w="9525">
                   <a:solidFill>
                     <a:srgbClr val="000000"/>
                   </a:solidFill>
@@ -4391,7 +4396,7 @@
             <a:fld id="{48A87A34-81AB-432B-8DAE-1953F412C126}" type="datetimeFigureOut">
               <a:rPr lang="en-US" dirty="0"/>
               <a:pPr/>
-              <a:t>7/4/2016</a:t>
+              <a:t>7/5/2016</a:t>
             </a:fld>
             <a:endParaRPr lang="en-US" dirty="0"/>
           </a:p>
@@ -4655,7 +4660,7 @@
             <a:fld id="{48A87A34-81AB-432B-8DAE-1953F412C126}" type="datetimeFigureOut">
               <a:rPr lang="en-US" dirty="0"/>
               <a:pPr/>
-              <a:t>7/4/2016</a:t>
+              <a:t>7/5/2016</a:t>
             </a:fld>
             <a:endParaRPr lang="en-US" dirty="0"/>
           </a:p>
@@ -4848,7 +4853,7 @@
             <a:fld id="{48A87A34-81AB-432B-8DAE-1953F412C126}" type="datetimeFigureOut">
               <a:rPr lang="en-US" dirty="0"/>
               <a:pPr/>
-              <a:t>7/4/2016</a:t>
+              <a:t>7/5/2016</a:t>
             </a:fld>
             <a:endParaRPr lang="en-US" dirty="0"/>
           </a:p>
@@ -5108,7 +5113,7 @@
             <a:fld id="{48A87A34-81AB-432B-8DAE-1953F412C126}" type="datetimeFigureOut">
               <a:rPr lang="en-US" dirty="0"/>
               <a:pPr/>
-              <a:t>7/4/2016</a:t>
+              <a:t>7/5/2016</a:t>
             </a:fld>
             <a:endParaRPr lang="en-US" dirty="0"/>
           </a:p>
@@ -5539,7 +5544,7 @@
             <a:fld id="{48A87A34-81AB-432B-8DAE-1953F412C126}" type="datetimeFigureOut">
               <a:rPr lang="en-US" dirty="0"/>
               <a:pPr/>
-              <a:t>7/4/2016</a:t>
+              <a:t>7/5/2016</a:t>
             </a:fld>
             <a:endParaRPr lang="en-US" dirty="0"/>
           </a:p>
@@ -6082,7 +6087,7 @@
             <a:fld id="{48A87A34-81AB-432B-8DAE-1953F412C126}" type="datetimeFigureOut">
               <a:rPr lang="en-US" dirty="0"/>
               <a:pPr/>
-              <a:t>7/4/2016</a:t>
+              <a:t>7/5/2016</a:t>
             </a:fld>
             <a:endParaRPr lang="en-US" dirty="0"/>
           </a:p>
@@ -6799,7 +6804,7 @@
             <a:fld id="{48A87A34-81AB-432B-8DAE-1953F412C126}" type="datetimeFigureOut">
               <a:rPr lang="en-US" dirty="0"/>
               <a:pPr/>
-              <a:t>7/4/2016</a:t>
+              <a:t>7/5/2016</a:t>
             </a:fld>
             <a:endParaRPr lang="en-US" dirty="0"/>
           </a:p>
@@ -6966,7 +6971,7 @@
             <a:fld id="{48A87A34-81AB-432B-8DAE-1953F412C126}" type="datetimeFigureOut">
               <a:rPr lang="en-US" dirty="0"/>
               <a:pPr/>
-              <a:t>7/4/2016</a:t>
+              <a:t>7/5/2016</a:t>
             </a:fld>
             <a:endParaRPr lang="en-US" dirty="0"/>
           </a:p>
@@ -7143,7 +7148,7 @@
             <a:fld id="{48A87A34-81AB-432B-8DAE-1953F412C126}" type="datetimeFigureOut">
               <a:rPr lang="en-US" dirty="0"/>
               <a:pPr/>
-              <a:t>7/4/2016</a:t>
+              <a:t>7/5/2016</a:t>
             </a:fld>
             <a:endParaRPr lang="en-US" dirty="0"/>
           </a:p>
@@ -7310,7 +7315,7 @@
             <a:fld id="{48A87A34-81AB-432B-8DAE-1953F412C126}" type="datetimeFigureOut">
               <a:rPr lang="en-US" dirty="0"/>
               <a:pPr/>
-              <a:t>7/4/2016</a:t>
+              <a:t>7/5/2016</a:t>
             </a:fld>
             <a:endParaRPr lang="en-US" dirty="0"/>
           </a:p>
@@ -7557,7 +7562,7 @@
             <a:fld id="{48A87A34-81AB-432B-8DAE-1953F412C126}" type="datetimeFigureOut">
               <a:rPr lang="en-US" dirty="0"/>
               <a:pPr/>
-              <a:t>7/4/2016</a:t>
+              <a:t>7/5/2016</a:t>
             </a:fld>
             <a:endParaRPr lang="en-US" dirty="0"/>
           </a:p>
@@ -7786,7 +7791,7 @@
             <a:fld id="{48A87A34-81AB-432B-8DAE-1953F412C126}" type="datetimeFigureOut">
               <a:rPr lang="en-US" dirty="0"/>
               <a:pPr/>
-              <a:t>7/4/2016</a:t>
+              <a:t>7/5/2016</a:t>
             </a:fld>
             <a:endParaRPr lang="en-US" dirty="0"/>
           </a:p>
@@ -8164,7 +8169,7 @@
             <a:fld id="{48A87A34-81AB-432B-8DAE-1953F412C126}" type="datetimeFigureOut">
               <a:rPr lang="en-US" dirty="0"/>
               <a:pPr/>
-              <a:t>7/4/2016</a:t>
+              <a:t>7/5/2016</a:t>
             </a:fld>
             <a:endParaRPr lang="en-US" dirty="0"/>
           </a:p>
@@ -8279,7 +8284,7 @@
             <a:fld id="{48A87A34-81AB-432B-8DAE-1953F412C126}" type="datetimeFigureOut">
               <a:rPr lang="en-US" dirty="0"/>
               <a:pPr/>
-              <a:t>7/4/2016</a:t>
+              <a:t>7/5/2016</a:t>
             </a:fld>
             <a:endParaRPr lang="en-US" dirty="0"/>
           </a:p>
@@ -8371,7 +8376,7 @@
             <a:fld id="{48A87A34-81AB-432B-8DAE-1953F412C126}" type="datetimeFigureOut">
               <a:rPr lang="en-US" dirty="0"/>
               <a:pPr/>
-              <a:t>7/4/2016</a:t>
+              <a:t>7/5/2016</a:t>
             </a:fld>
             <a:endParaRPr lang="en-US" dirty="0"/>
           </a:p>
@@ -8617,7 +8622,7 @@
             <a:fld id="{48A87A34-81AB-432B-8DAE-1953F412C126}" type="datetimeFigureOut">
               <a:rPr lang="en-US" dirty="0"/>
               <a:pPr/>
-              <a:t>7/4/2016</a:t>
+              <a:t>7/5/2016</a:t>
             </a:fld>
             <a:endParaRPr lang="en-US" dirty="0"/>
           </a:p>
@@ -8894,7 +8899,7 @@
             <a:fld id="{48A87A34-81AB-432B-8DAE-1953F412C126}" type="datetimeFigureOut">
               <a:rPr lang="en-US" dirty="0"/>
               <a:pPr/>
-              <a:t>7/4/2016</a:t>
+              <a:t>7/5/2016</a:t>
             </a:fld>
             <a:endParaRPr lang="en-US" dirty="0"/>
           </a:p>
@@ -8986,7 +8991,7 @@
             <a:alphaModFix amt="30000"/>
             <a:extLst>
               <a:ext uri="{28A0092B-C50C-407E-A947-70E740481C1C}">
-                <a14:useLocalDpi xmlns:a14="http://schemas.microsoft.com/office/drawing/2010/main" xmlns="" val="0"/>
+                <a14:useLocalDpi xmlns="" xmlns:a14="http://schemas.microsoft.com/office/drawing/2010/main" val="0"/>
               </a:ext>
             </a:extLst>
           </a:blip>
@@ -9006,7 +9011,7 @@
           <a:noFill/>
           <a:extLst>
             <a:ext uri="{909E8E84-426E-40dd-AFC4-6F175D3DCCD1}">
-              <a14:hiddenFill xmlns:a14="http://schemas.microsoft.com/office/drawing/2010/main" xmlns="">
+              <a14:hiddenFill xmlns="" xmlns:a14="http://schemas.microsoft.com/office/drawing/2010/main">
                 <a:solidFill>
                   <a:srgbClr val="FFFFFF"/>
                 </a:solidFill>
@@ -9080,7 +9085,7 @@
               </a:ln>
               <a:extLst>
                 <a:ext uri="{91240B29-F687-4f45-9708-019B960494DF}">
-                  <a14:hiddenLine xmlns:a14="http://schemas.microsoft.com/office/drawing/2010/main" xmlns="" w="9525">
+                  <a14:hiddenLine xmlns="" xmlns:a14="http://schemas.microsoft.com/office/drawing/2010/main" w="9525">
                     <a:solidFill>
                       <a:srgbClr val="000000"/>
                     </a:solidFill>
@@ -9170,7 +9175,7 @@
               </a:ln>
               <a:extLst>
                 <a:ext uri="{91240B29-F687-4f45-9708-019B960494DF}">
-                  <a14:hiddenLine xmlns:a14="http://schemas.microsoft.com/office/drawing/2010/main" xmlns="" w="9525">
+                  <a14:hiddenLine xmlns="" xmlns:a14="http://schemas.microsoft.com/office/drawing/2010/main" w="9525">
                     <a:solidFill>
                       <a:srgbClr val="000000"/>
                     </a:solidFill>
@@ -9260,7 +9265,7 @@
               </a:ln>
               <a:extLst>
                 <a:ext uri="{91240B29-F687-4f45-9708-019B960494DF}">
-                  <a14:hiddenLine xmlns:a14="http://schemas.microsoft.com/office/drawing/2010/main" xmlns="" w="9525">
+                  <a14:hiddenLine xmlns="" xmlns:a14="http://schemas.microsoft.com/office/drawing/2010/main" w="9525">
                     <a:solidFill>
                       <a:srgbClr val="000000"/>
                     </a:solidFill>
@@ -9322,7 +9327,7 @@
               </a:ln>
               <a:extLst>
                 <a:ext uri="{91240B29-F687-4f45-9708-019B960494DF}">
-                  <a14:hiddenLine xmlns:a14="http://schemas.microsoft.com/office/drawing/2010/main" xmlns="" w="9525">
+                  <a14:hiddenLine xmlns="" xmlns:a14="http://schemas.microsoft.com/office/drawing/2010/main" w="9525">
                     <a:solidFill>
                       <a:srgbClr val="000000"/>
                     </a:solidFill>
@@ -9412,7 +9417,7 @@
               </a:ln>
               <a:extLst>
                 <a:ext uri="{91240B29-F687-4f45-9708-019B960494DF}">
-                  <a14:hiddenLine xmlns:a14="http://schemas.microsoft.com/office/drawing/2010/main" xmlns="" w="9525">
+                  <a14:hiddenLine xmlns="" xmlns:a14="http://schemas.microsoft.com/office/drawing/2010/main" w="9525">
                     <a:solidFill>
                       <a:srgbClr val="000000"/>
                     </a:solidFill>
@@ -9474,7 +9479,7 @@
               </a:ln>
               <a:extLst>
                 <a:ext uri="{91240B29-F687-4f45-9708-019B960494DF}">
-                  <a14:hiddenLine xmlns:a14="http://schemas.microsoft.com/office/drawing/2010/main" xmlns="" w="9525">
+                  <a14:hiddenLine xmlns="" xmlns:a14="http://schemas.microsoft.com/office/drawing/2010/main" w="9525">
                     <a:solidFill>
                       <a:srgbClr val="000000"/>
                     </a:solidFill>
@@ -9536,7 +9541,7 @@
               </a:ln>
               <a:extLst>
                 <a:ext uri="{91240B29-F687-4f45-9708-019B960494DF}">
-                  <a14:hiddenLine xmlns:a14="http://schemas.microsoft.com/office/drawing/2010/main" xmlns="" w="9525">
+                  <a14:hiddenLine xmlns="" xmlns:a14="http://schemas.microsoft.com/office/drawing/2010/main" w="9525">
                     <a:solidFill>
                       <a:srgbClr val="000000"/>
                     </a:solidFill>
@@ -9626,7 +9631,7 @@
               </a:ln>
               <a:extLst>
                 <a:ext uri="{91240B29-F687-4f45-9708-019B960494DF}">
-                  <a14:hiddenLine xmlns:a14="http://schemas.microsoft.com/office/drawing/2010/main" xmlns="" w="9525">
+                  <a14:hiddenLine xmlns="" xmlns:a14="http://schemas.microsoft.com/office/drawing/2010/main" w="9525">
                     <a:solidFill>
                       <a:srgbClr val="000000"/>
                     </a:solidFill>
@@ -9716,7 +9721,7 @@
               </a:ln>
               <a:extLst>
                 <a:ext uri="{91240B29-F687-4f45-9708-019B960494DF}">
-                  <a14:hiddenLine xmlns:a14="http://schemas.microsoft.com/office/drawing/2010/main" xmlns="" w="9525">
+                  <a14:hiddenLine xmlns="" xmlns:a14="http://schemas.microsoft.com/office/drawing/2010/main" w="9525">
                     <a:solidFill>
                       <a:srgbClr val="000000"/>
                     </a:solidFill>
@@ -9778,7 +9783,7 @@
               </a:ln>
               <a:extLst>
                 <a:ext uri="{91240B29-F687-4f45-9708-019B960494DF}">
-                  <a14:hiddenLine xmlns:a14="http://schemas.microsoft.com/office/drawing/2010/main" xmlns="" w="9525">
+                  <a14:hiddenLine xmlns="" xmlns:a14="http://schemas.microsoft.com/office/drawing/2010/main" w="9525">
                     <a:solidFill>
                       <a:srgbClr val="000000"/>
                     </a:solidFill>
@@ -9888,7 +9893,7 @@
               </a:ln>
               <a:extLst>
                 <a:ext uri="{91240B29-F687-4f45-9708-019B960494DF}">
-                  <a14:hiddenLine xmlns:a14="http://schemas.microsoft.com/office/drawing/2010/main" xmlns="" w="9525">
+                  <a14:hiddenLine xmlns="" xmlns:a14="http://schemas.microsoft.com/office/drawing/2010/main" w="9525">
                     <a:solidFill>
                       <a:srgbClr val="000000"/>
                     </a:solidFill>
@@ -9972,7 +9977,7 @@
               </a:ln>
               <a:extLst>
                 <a:ext uri="{91240B29-F687-4f45-9708-019B960494DF}">
-                  <a14:hiddenLine xmlns:a14="http://schemas.microsoft.com/office/drawing/2010/main" xmlns="" w="9525">
+                  <a14:hiddenLine xmlns="" xmlns:a14="http://schemas.microsoft.com/office/drawing/2010/main" w="9525">
                     <a:solidFill>
                       <a:srgbClr val="000000"/>
                     </a:solidFill>
@@ -10034,7 +10039,7 @@
               </a:ln>
               <a:extLst>
                 <a:ext uri="{91240B29-F687-4f45-9708-019B960494DF}">
-                  <a14:hiddenLine xmlns:a14="http://schemas.microsoft.com/office/drawing/2010/main" xmlns="" w="9525">
+                  <a14:hiddenLine xmlns="" xmlns:a14="http://schemas.microsoft.com/office/drawing/2010/main" w="9525">
                     <a:solidFill>
                       <a:srgbClr val="000000"/>
                     </a:solidFill>
@@ -10096,7 +10101,7 @@
               </a:ln>
               <a:extLst>
                 <a:ext uri="{91240B29-F687-4f45-9708-019B960494DF}">
-                  <a14:hiddenLine xmlns:a14="http://schemas.microsoft.com/office/drawing/2010/main" xmlns="" w="9525">
+                  <a14:hiddenLine xmlns="" xmlns:a14="http://schemas.microsoft.com/office/drawing/2010/main" w="9525">
                     <a:solidFill>
                       <a:srgbClr val="000000"/>
                     </a:solidFill>
@@ -10186,7 +10191,7 @@
               </a:ln>
               <a:extLst>
                 <a:ext uri="{91240B29-F687-4f45-9708-019B960494DF}">
-                  <a14:hiddenLine xmlns:a14="http://schemas.microsoft.com/office/drawing/2010/main" xmlns="" w="9525">
+                  <a14:hiddenLine xmlns="" xmlns:a14="http://schemas.microsoft.com/office/drawing/2010/main" w="9525">
                     <a:solidFill>
                       <a:srgbClr val="000000"/>
                     </a:solidFill>
@@ -10220,7 +10225,7 @@
               </a:ln>
               <a:extLst>
                 <a:ext uri="{91240B29-F687-4f45-9708-019B960494DF}">
-                  <a14:hiddenLine xmlns:a14="http://schemas.microsoft.com/office/drawing/2010/main" xmlns="" w="9525">
+                  <a14:hiddenLine xmlns="" xmlns:a14="http://schemas.microsoft.com/office/drawing/2010/main" w="9525">
                     <a:solidFill>
                       <a:srgbClr val="000000"/>
                     </a:solidFill>
@@ -10285,7 +10290,7 @@
               </a:ln>
               <a:extLst>
                 <a:ext uri="{91240B29-F687-4f45-9708-019B960494DF}">
-                  <a14:hiddenLine xmlns:a14="http://schemas.microsoft.com/office/drawing/2010/main" xmlns="" w="9525">
+                  <a14:hiddenLine xmlns="" xmlns:a14="http://schemas.microsoft.com/office/drawing/2010/main" w="9525">
                     <a:solidFill>
                       <a:srgbClr val="000000"/>
                     </a:solidFill>
@@ -10375,7 +10380,7 @@
               </a:ln>
               <a:extLst>
                 <a:ext uri="{91240B29-F687-4f45-9708-019B960494DF}">
-                  <a14:hiddenLine xmlns:a14="http://schemas.microsoft.com/office/drawing/2010/main" xmlns="" w="9525">
+                  <a14:hiddenLine xmlns="" xmlns:a14="http://schemas.microsoft.com/office/drawing/2010/main" w="9525">
                     <a:solidFill>
                       <a:srgbClr val="000000"/>
                     </a:solidFill>
@@ -10437,7 +10442,7 @@
               </a:ln>
               <a:extLst>
                 <a:ext uri="{91240B29-F687-4f45-9708-019B960494DF}">
-                  <a14:hiddenLine xmlns:a14="http://schemas.microsoft.com/office/drawing/2010/main" xmlns="" w="9525">
+                  <a14:hiddenLine xmlns="" xmlns:a14="http://schemas.microsoft.com/office/drawing/2010/main" w="9525">
                     <a:solidFill>
                       <a:srgbClr val="000000"/>
                     </a:solidFill>
@@ -10527,7 +10532,7 @@
               </a:ln>
               <a:extLst>
                 <a:ext uri="{91240B29-F687-4f45-9708-019B960494DF}">
-                  <a14:hiddenLine xmlns:a14="http://schemas.microsoft.com/office/drawing/2010/main" xmlns="" w="9525">
+                  <a14:hiddenLine xmlns="" xmlns:a14="http://schemas.microsoft.com/office/drawing/2010/main" w="9525">
                     <a:solidFill>
                       <a:srgbClr val="000000"/>
                     </a:solidFill>
@@ -10592,7 +10597,7 @@
               </a:ln>
               <a:extLst>
                 <a:ext uri="{91240B29-F687-4f45-9708-019B960494DF}">
-                  <a14:hiddenLine xmlns:a14="http://schemas.microsoft.com/office/drawing/2010/main" xmlns="" w="9525">
+                  <a14:hiddenLine xmlns="" xmlns:a14="http://schemas.microsoft.com/office/drawing/2010/main" w="9525">
                     <a:solidFill>
                       <a:srgbClr val="000000"/>
                     </a:solidFill>
@@ -10654,7 +10659,7 @@
               </a:ln>
               <a:extLst>
                 <a:ext uri="{91240B29-F687-4f45-9708-019B960494DF}">
-                  <a14:hiddenLine xmlns:a14="http://schemas.microsoft.com/office/drawing/2010/main" xmlns="" w="9525">
+                  <a14:hiddenLine xmlns="" xmlns:a14="http://schemas.microsoft.com/office/drawing/2010/main" w="9525">
                     <a:solidFill>
                       <a:srgbClr val="000000"/>
                     </a:solidFill>
@@ -10744,7 +10749,7 @@
               </a:ln>
               <a:extLst>
                 <a:ext uri="{91240B29-F687-4f45-9708-019B960494DF}">
-                  <a14:hiddenLine xmlns:a14="http://schemas.microsoft.com/office/drawing/2010/main" xmlns="" w="9525">
+                  <a14:hiddenLine xmlns="" xmlns:a14="http://schemas.microsoft.com/office/drawing/2010/main" w="9525">
                     <a:solidFill>
                       <a:srgbClr val="000000"/>
                     </a:solidFill>
@@ -10834,7 +10839,7 @@
               </a:ln>
               <a:extLst>
                 <a:ext uri="{91240B29-F687-4f45-9708-019B960494DF}">
-                  <a14:hiddenLine xmlns:a14="http://schemas.microsoft.com/office/drawing/2010/main" xmlns="" w="9525">
+                  <a14:hiddenLine xmlns="" xmlns:a14="http://schemas.microsoft.com/office/drawing/2010/main" w="9525">
                     <a:solidFill>
                       <a:srgbClr val="000000"/>
                     </a:solidFill>
@@ -10899,7 +10904,7 @@
               </a:ln>
               <a:extLst>
                 <a:ext uri="{91240B29-F687-4f45-9708-019B960494DF}">
-                  <a14:hiddenLine xmlns:a14="http://schemas.microsoft.com/office/drawing/2010/main" xmlns="" w="9525">
+                  <a14:hiddenLine xmlns="" xmlns:a14="http://schemas.microsoft.com/office/drawing/2010/main" w="9525">
                     <a:solidFill>
                       <a:srgbClr val="000000"/>
                     </a:solidFill>
@@ -11019,7 +11024,7 @@
               </a:ln>
               <a:extLst>
                 <a:ext uri="{91240B29-F687-4f45-9708-019B960494DF}">
-                  <a14:hiddenLine xmlns:a14="http://schemas.microsoft.com/office/drawing/2010/main" xmlns="" w="9525">
+                  <a14:hiddenLine xmlns="" xmlns:a14="http://schemas.microsoft.com/office/drawing/2010/main" w="9525">
                     <a:solidFill>
                       <a:srgbClr val="000000"/>
                     </a:solidFill>
@@ -11117,7 +11122,7 @@
               </a:ln>
               <a:extLst>
                 <a:ext uri="{91240B29-F687-4f45-9708-019B960494DF}">
-                  <a14:hiddenLine xmlns:a14="http://schemas.microsoft.com/office/drawing/2010/main" xmlns="" w="9525">
+                  <a14:hiddenLine xmlns="" xmlns:a14="http://schemas.microsoft.com/office/drawing/2010/main" w="9525">
                     <a:solidFill>
                       <a:srgbClr val="000000"/>
                     </a:solidFill>
@@ -11232,7 +11237,7 @@
               </a:ln>
               <a:extLst>
                 <a:ext uri="{91240B29-F687-4f45-9708-019B960494DF}">
-                  <a14:hiddenLine xmlns:a14="http://schemas.microsoft.com/office/drawing/2010/main" xmlns="" w="9525">
+                  <a14:hiddenLine xmlns="" xmlns:a14="http://schemas.microsoft.com/office/drawing/2010/main" w="9525">
                     <a:solidFill>
                       <a:srgbClr val="000000"/>
                     </a:solidFill>
@@ -11322,7 +11327,7 @@
               </a:ln>
               <a:extLst>
                 <a:ext uri="{91240B29-F687-4f45-9708-019B960494DF}">
-                  <a14:hiddenLine xmlns:a14="http://schemas.microsoft.com/office/drawing/2010/main" xmlns="" w="9525">
+                  <a14:hiddenLine xmlns="" xmlns:a14="http://schemas.microsoft.com/office/drawing/2010/main" w="9525">
                     <a:solidFill>
                       <a:srgbClr val="000000"/>
                     </a:solidFill>
@@ -11387,7 +11392,7 @@
               </a:ln>
               <a:extLst>
                 <a:ext uri="{91240B29-F687-4f45-9708-019B960494DF}">
-                  <a14:hiddenLine xmlns:a14="http://schemas.microsoft.com/office/drawing/2010/main" xmlns="" w="9525">
+                  <a14:hiddenLine xmlns="" xmlns:a14="http://schemas.microsoft.com/office/drawing/2010/main" w="9525">
                     <a:solidFill>
                       <a:srgbClr val="000000"/>
                     </a:solidFill>
@@ -11477,7 +11482,7 @@
               </a:ln>
               <a:extLst>
                 <a:ext uri="{91240B29-F687-4f45-9708-019B960494DF}">
-                  <a14:hiddenLine xmlns:a14="http://schemas.microsoft.com/office/drawing/2010/main" xmlns="" w="9525">
+                  <a14:hiddenLine xmlns="" xmlns:a14="http://schemas.microsoft.com/office/drawing/2010/main" w="9525">
                     <a:solidFill>
                       <a:srgbClr val="000000"/>
                     </a:solidFill>
@@ -11545,7 +11550,7 @@
               </a:ln>
               <a:extLst>
                 <a:ext uri="{91240B29-F687-4f45-9708-019B960494DF}">
-                  <a14:hiddenLine xmlns:a14="http://schemas.microsoft.com/office/drawing/2010/main" xmlns="" w="9525">
+                  <a14:hiddenLine xmlns="" xmlns:a14="http://schemas.microsoft.com/office/drawing/2010/main" w="9525">
                     <a:solidFill>
                       <a:srgbClr val="000000"/>
                     </a:solidFill>
@@ -11635,7 +11640,7 @@
               </a:ln>
               <a:extLst>
                 <a:ext uri="{91240B29-F687-4f45-9708-019B960494DF}">
-                  <a14:hiddenLine xmlns:a14="http://schemas.microsoft.com/office/drawing/2010/main" xmlns="" w="9525">
+                  <a14:hiddenLine xmlns="" xmlns:a14="http://schemas.microsoft.com/office/drawing/2010/main" w="9525">
                     <a:solidFill>
                       <a:srgbClr val="000000"/>
                     </a:solidFill>
@@ -11703,7 +11708,7 @@
               </a:ln>
               <a:extLst>
                 <a:ext uri="{91240B29-F687-4f45-9708-019B960494DF}">
-                  <a14:hiddenLine xmlns:a14="http://schemas.microsoft.com/office/drawing/2010/main" xmlns="" w="9525">
+                  <a14:hiddenLine xmlns="" xmlns:a14="http://schemas.microsoft.com/office/drawing/2010/main" w="9525">
                     <a:solidFill>
                       <a:srgbClr val="000000"/>
                     </a:solidFill>
@@ -11793,7 +11798,7 @@
               </a:ln>
               <a:extLst>
                 <a:ext uri="{91240B29-F687-4f45-9708-019B960494DF}">
-                  <a14:hiddenLine xmlns:a14="http://schemas.microsoft.com/office/drawing/2010/main" xmlns="" w="9525">
+                  <a14:hiddenLine xmlns="" xmlns:a14="http://schemas.microsoft.com/office/drawing/2010/main" w="9525">
                     <a:solidFill>
                       <a:srgbClr val="000000"/>
                     </a:solidFill>
@@ -11827,7 +11832,7 @@
               </a:ln>
               <a:extLst>
                 <a:ext uri="{91240B29-F687-4f45-9708-019B960494DF}">
-                  <a14:hiddenLine xmlns:a14="http://schemas.microsoft.com/office/drawing/2010/main" xmlns="" w="9525">
+                  <a14:hiddenLine xmlns="" xmlns:a14="http://schemas.microsoft.com/office/drawing/2010/main" w="9525">
                     <a:solidFill>
                       <a:srgbClr val="000000"/>
                     </a:solidFill>
@@ -11968,7 +11973,7 @@
             <a:fld id="{48A87A34-81AB-432B-8DAE-1953F412C126}" type="datetimeFigureOut">
               <a:rPr lang="en-US" dirty="0"/>
               <a:pPr/>
-              <a:t>7/4/2016</a:t>
+              <a:t>7/5/2016</a:t>
             </a:fld>
             <a:endParaRPr lang="en-US" dirty="0"/>
           </a:p>
@@ -12433,7 +12438,7 @@
     </p:spTree>
     <p:extLst>
       <p:ext uri="{BB962C8B-B14F-4D97-AF65-F5344CB8AC3E}">
-        <p14:creationId xmlns:p14="http://schemas.microsoft.com/office/powerpoint/2010/main" xmlns="" val="4193971689"/>
+        <p14:creationId xmlns="" xmlns:p14="http://schemas.microsoft.com/office/powerpoint/2010/main" val="4193971689"/>
       </p:ext>
     </p:extLst>
   </p:cSld>
@@ -12480,15 +12485,15 @@
         <p:spPr/>
         <p:txBody>
           <a:bodyPr>
-            <a:normAutofit fontScale="90000"/>
+            <a:normAutofit/>
           </a:bodyPr>
           <a:lstStyle/>
           <a:p>
             <a:r>
-              <a:rPr lang="en-US" smtClean="0"/>
-              <a:t>Grab images from https://www.pinterest.com/pin/323766660687379381/</a:t>
+              <a:rPr lang="en-US" dirty="0" smtClean="0"/>
+              <a:t>What does a programmer do?</a:t>
             </a:r>
-            <a:endParaRPr lang="en-US"/>
+            <a:endParaRPr lang="en-US" dirty="0"/>
           </a:p>
         </p:txBody>
       </p:sp>
@@ -12516,6 +12521,13 @@
   <p:clrMapOvr>
     <a:masterClrMapping/>
   </p:clrMapOvr>
+  <p:timing>
+    <p:tnLst>
+      <p:par>
+        <p:cTn id="1" dur="indefinite" restart="never" nodeType="tmRoot"/>
+      </p:par>
+    </p:tnLst>
+  </p:timing>
 </p:sld>
 </file>
 
@@ -12551,6 +12563,401 @@
           <a:bodyPr/>
           <a:lstStyle/>
           <a:p>
+            <a:pPr algn="ctr"/>
+            <a:r>
+              <a:rPr lang="en-US" dirty="0" smtClean="0"/>
+              <a:t>What friends think I do</a:t>
+            </a:r>
+            <a:endParaRPr lang="en-US" dirty="0"/>
+          </a:p>
+        </p:txBody>
+      </p:sp>
+      <p:pic>
+        <p:nvPicPr>
+          <p:cNvPr id="4" name="Content Placeholder 3" descr="programmerimage3.PNG"/>
+          <p:cNvPicPr>
+            <a:picLocks noGrp="1" noChangeAspect="1"/>
+          </p:cNvPicPr>
+          <p:nvPr>
+            <p:ph idx="1"/>
+          </p:nvPr>
+        </p:nvPicPr>
+        <p:blipFill>
+          <a:blip r:embed="rId2"/>
+          <a:stretch>
+            <a:fillRect/>
+          </a:stretch>
+        </p:blipFill>
+        <p:spPr>
+          <a:xfrm>
+            <a:off x="2847701" y="2533310"/>
+            <a:ext cx="6144725" cy="3462541"/>
+          </a:xfrm>
+        </p:spPr>
+      </p:pic>
+    </p:spTree>
+  </p:cSld>
+  <p:clrMapOvr>
+    <a:masterClrMapping/>
+  </p:clrMapOvr>
+  <p:timing>
+    <p:tnLst>
+      <p:par>
+        <p:cTn id="1" dur="indefinite" restart="never" nodeType="tmRoot"/>
+      </p:par>
+    </p:tnLst>
+  </p:timing>
+</p:sld>
+</file>
+
+<file path=ppt/slides/slide4.xml><?xml version="1.0" encoding="utf-8"?>
+<p:sld xmlns:a="http://schemas.openxmlformats.org/drawingml/2006/main" xmlns:r="http://schemas.openxmlformats.org/officeDocument/2006/relationships" xmlns:p="http://schemas.openxmlformats.org/presentationml/2006/main">
+  <p:cSld>
+    <p:spTree>
+      <p:nvGrpSpPr>
+        <p:cNvPr id="1" name=""/>
+        <p:cNvGrpSpPr/>
+        <p:nvPr/>
+      </p:nvGrpSpPr>
+      <p:grpSpPr>
+        <a:xfrm>
+          <a:off x="0" y="0"/>
+          <a:ext cx="0" cy="0"/>
+          <a:chOff x="0" y="0"/>
+          <a:chExt cx="0" cy="0"/>
+        </a:xfrm>
+      </p:grpSpPr>
+      <p:sp>
+        <p:nvSpPr>
+          <p:cNvPr id="2" name="Title 1"/>
+          <p:cNvSpPr>
+            <a:spLocks noGrp="1"/>
+          </p:cNvSpPr>
+          <p:nvPr>
+            <p:ph type="title"/>
+          </p:nvPr>
+        </p:nvSpPr>
+        <p:spPr/>
+        <p:txBody>
+          <a:bodyPr/>
+          <a:lstStyle/>
+          <a:p>
+            <a:pPr algn="ctr"/>
+            <a:r>
+              <a:rPr lang="en-US" dirty="0" smtClean="0"/>
+              <a:t>What my family thinks I do</a:t>
+            </a:r>
+            <a:endParaRPr lang="en-US" dirty="0"/>
+          </a:p>
+        </p:txBody>
+      </p:sp>
+      <p:pic>
+        <p:nvPicPr>
+          <p:cNvPr id="6" name="Content Placeholder 5" descr="programmerimage10.PNG"/>
+          <p:cNvPicPr>
+            <a:picLocks noGrp="1" noChangeAspect="1"/>
+          </p:cNvPicPr>
+          <p:nvPr>
+            <p:ph idx="1"/>
+          </p:nvPr>
+        </p:nvPicPr>
+        <p:blipFill>
+          <a:blip r:embed="rId2"/>
+          <a:stretch>
+            <a:fillRect/>
+          </a:stretch>
+        </p:blipFill>
+        <p:spPr>
+          <a:xfrm>
+            <a:off x="3872802" y="2776567"/>
+            <a:ext cx="4108604" cy="3144858"/>
+          </a:xfrm>
+        </p:spPr>
+      </p:pic>
+    </p:spTree>
+  </p:cSld>
+  <p:clrMapOvr>
+    <a:masterClrMapping/>
+  </p:clrMapOvr>
+  <p:timing>
+    <p:tnLst>
+      <p:par>
+        <p:cTn id="1" dur="indefinite" restart="never" nodeType="tmRoot"/>
+      </p:par>
+    </p:tnLst>
+  </p:timing>
+</p:sld>
+</file>
+
+<file path=ppt/slides/slide5.xml><?xml version="1.0" encoding="utf-8"?>
+<p:sld xmlns:a="http://schemas.openxmlformats.org/drawingml/2006/main" xmlns:r="http://schemas.openxmlformats.org/officeDocument/2006/relationships" xmlns:p="http://schemas.openxmlformats.org/presentationml/2006/main">
+  <p:cSld>
+    <p:spTree>
+      <p:nvGrpSpPr>
+        <p:cNvPr id="1" name=""/>
+        <p:cNvGrpSpPr/>
+        <p:nvPr/>
+      </p:nvGrpSpPr>
+      <p:grpSpPr>
+        <a:xfrm>
+          <a:off x="0" y="0"/>
+          <a:ext cx="0" cy="0"/>
+          <a:chOff x="0" y="0"/>
+          <a:chExt cx="0" cy="0"/>
+        </a:xfrm>
+      </p:grpSpPr>
+      <p:sp>
+        <p:nvSpPr>
+          <p:cNvPr id="2" name="Title 1"/>
+          <p:cNvSpPr>
+            <a:spLocks noGrp="1"/>
+          </p:cNvSpPr>
+          <p:nvPr>
+            <p:ph type="title"/>
+          </p:nvPr>
+        </p:nvSpPr>
+        <p:spPr/>
+        <p:txBody>
+          <a:bodyPr/>
+          <a:lstStyle/>
+          <a:p>
+            <a:pPr algn="ctr"/>
+            <a:r>
+              <a:rPr lang="en-US" dirty="0" smtClean="0"/>
+              <a:t>What the boss thinks I do</a:t>
+            </a:r>
+            <a:endParaRPr lang="en-US" dirty="0"/>
+          </a:p>
+        </p:txBody>
+      </p:sp>
+      <p:pic>
+        <p:nvPicPr>
+          <p:cNvPr id="6" name="Content Placeholder 5" descr="programmerimage5.PNG"/>
+          <p:cNvPicPr>
+            <a:picLocks noGrp="1" noChangeAspect="1"/>
+          </p:cNvPicPr>
+          <p:nvPr>
+            <p:ph idx="1"/>
+          </p:nvPr>
+        </p:nvPicPr>
+        <p:blipFill>
+          <a:blip r:embed="rId2"/>
+          <a:stretch>
+            <a:fillRect/>
+          </a:stretch>
+        </p:blipFill>
+        <p:spPr>
+          <a:xfrm>
+            <a:off x="3853544" y="2414056"/>
+            <a:ext cx="4741816" cy="3814069"/>
+          </a:xfrm>
+        </p:spPr>
+      </p:pic>
+    </p:spTree>
+  </p:cSld>
+  <p:clrMapOvr>
+    <a:masterClrMapping/>
+  </p:clrMapOvr>
+  <p:timing>
+    <p:tnLst>
+      <p:par>
+        <p:cTn id="1" dur="indefinite" restart="never" nodeType="tmRoot"/>
+      </p:par>
+    </p:tnLst>
+  </p:timing>
+</p:sld>
+</file>
+
+<file path=ppt/slides/slide6.xml><?xml version="1.0" encoding="utf-8"?>
+<p:sld xmlns:a="http://schemas.openxmlformats.org/drawingml/2006/main" xmlns:r="http://schemas.openxmlformats.org/officeDocument/2006/relationships" xmlns:p="http://schemas.openxmlformats.org/presentationml/2006/main">
+  <p:cSld>
+    <p:spTree>
+      <p:nvGrpSpPr>
+        <p:cNvPr id="1" name=""/>
+        <p:cNvGrpSpPr/>
+        <p:nvPr/>
+      </p:nvGrpSpPr>
+      <p:grpSpPr>
+        <a:xfrm>
+          <a:off x="0" y="0"/>
+          <a:ext cx="0" cy="0"/>
+          <a:chOff x="0" y="0"/>
+          <a:chExt cx="0" cy="0"/>
+        </a:xfrm>
+      </p:grpSpPr>
+      <p:sp>
+        <p:nvSpPr>
+          <p:cNvPr id="2" name="Title 1"/>
+          <p:cNvSpPr>
+            <a:spLocks noGrp="1"/>
+          </p:cNvSpPr>
+          <p:nvPr>
+            <p:ph type="title"/>
+          </p:nvPr>
+        </p:nvSpPr>
+        <p:spPr/>
+        <p:txBody>
+          <a:bodyPr/>
+          <a:lstStyle/>
+          <a:p>
+            <a:pPr algn="ctr"/>
+            <a:r>
+              <a:rPr lang="en-US" dirty="0" smtClean="0"/>
+              <a:t>What I think I do</a:t>
+            </a:r>
+            <a:endParaRPr lang="en-US" dirty="0"/>
+          </a:p>
+        </p:txBody>
+      </p:sp>
+      <p:pic>
+        <p:nvPicPr>
+          <p:cNvPr id="6" name="Content Placeholder 5" descr="programmerimage11.PNG"/>
+          <p:cNvPicPr>
+            <a:picLocks noGrp="1" noChangeAspect="1"/>
+          </p:cNvPicPr>
+          <p:nvPr>
+            <p:ph idx="1"/>
+          </p:nvPr>
+        </p:nvPicPr>
+        <p:blipFill>
+          <a:blip r:embed="rId2"/>
+          <a:stretch>
+            <a:fillRect/>
+          </a:stretch>
+        </p:blipFill>
+        <p:spPr>
+          <a:xfrm>
+            <a:off x="3826063" y="2227742"/>
+            <a:ext cx="5031766" cy="3297847"/>
+          </a:xfrm>
+        </p:spPr>
+      </p:pic>
+    </p:spTree>
+  </p:cSld>
+  <p:clrMapOvr>
+    <a:masterClrMapping/>
+  </p:clrMapOvr>
+  <p:timing>
+    <p:tnLst>
+      <p:par>
+        <p:cTn id="1" dur="indefinite" restart="never" nodeType="tmRoot"/>
+      </p:par>
+    </p:tnLst>
+  </p:timing>
+</p:sld>
+</file>
+
+<file path=ppt/slides/slide7.xml><?xml version="1.0" encoding="utf-8"?>
+<p:sld xmlns:a="http://schemas.openxmlformats.org/drawingml/2006/main" xmlns:r="http://schemas.openxmlformats.org/officeDocument/2006/relationships" xmlns:p="http://schemas.openxmlformats.org/presentationml/2006/main">
+  <p:cSld>
+    <p:spTree>
+      <p:nvGrpSpPr>
+        <p:cNvPr id="1" name=""/>
+        <p:cNvGrpSpPr/>
+        <p:nvPr/>
+      </p:nvGrpSpPr>
+      <p:grpSpPr>
+        <a:xfrm>
+          <a:off x="0" y="0"/>
+          <a:ext cx="0" cy="0"/>
+          <a:chOff x="0" y="0"/>
+          <a:chExt cx="0" cy="0"/>
+        </a:xfrm>
+      </p:grpSpPr>
+      <p:sp>
+        <p:nvSpPr>
+          <p:cNvPr id="2" name="Title 1"/>
+          <p:cNvSpPr>
+            <a:spLocks noGrp="1"/>
+          </p:cNvSpPr>
+          <p:nvPr>
+            <p:ph type="title"/>
+          </p:nvPr>
+        </p:nvSpPr>
+        <p:spPr/>
+        <p:txBody>
+          <a:bodyPr/>
+          <a:lstStyle/>
+          <a:p>
+            <a:pPr algn="ctr"/>
+            <a:r>
+              <a:rPr lang="en-US" dirty="0" smtClean="0"/>
+              <a:t>What I really do</a:t>
+            </a:r>
+            <a:endParaRPr lang="en-US" dirty="0"/>
+          </a:p>
+        </p:txBody>
+      </p:sp>
+      <p:pic>
+        <p:nvPicPr>
+          <p:cNvPr id="6" name="Content Placeholder 5" descr="programmerimage9.PNG"/>
+          <p:cNvPicPr>
+            <a:picLocks noGrp="1" noChangeAspect="1"/>
+          </p:cNvPicPr>
+          <p:nvPr>
+            <p:ph idx="1"/>
+          </p:nvPr>
+        </p:nvPicPr>
+        <p:blipFill>
+          <a:blip r:embed="rId2"/>
+          <a:stretch>
+            <a:fillRect/>
+          </a:stretch>
+        </p:blipFill>
+        <p:spPr>
+          <a:xfrm>
+            <a:off x="3905794" y="1951742"/>
+            <a:ext cx="4236954" cy="3808978"/>
+          </a:xfrm>
+        </p:spPr>
+      </p:pic>
+    </p:spTree>
+  </p:cSld>
+  <p:clrMapOvr>
+    <a:masterClrMapping/>
+  </p:clrMapOvr>
+  <p:timing>
+    <p:tnLst>
+      <p:par>
+        <p:cTn id="1" dur="indefinite" restart="never" nodeType="tmRoot"/>
+      </p:par>
+    </p:tnLst>
+  </p:timing>
+</p:sld>
+</file>
+
+<file path=ppt/slides/slide8.xml><?xml version="1.0" encoding="utf-8"?>
+<p:sld xmlns:a="http://schemas.openxmlformats.org/drawingml/2006/main" xmlns:r="http://schemas.openxmlformats.org/officeDocument/2006/relationships" xmlns:p="http://schemas.openxmlformats.org/presentationml/2006/main">
+  <p:cSld>
+    <p:spTree>
+      <p:nvGrpSpPr>
+        <p:cNvPr id="1" name=""/>
+        <p:cNvGrpSpPr/>
+        <p:nvPr/>
+      </p:nvGrpSpPr>
+      <p:grpSpPr>
+        <a:xfrm>
+          <a:off x="0" y="0"/>
+          <a:ext cx="0" cy="0"/>
+          <a:chOff x="0" y="0"/>
+          <a:chExt cx="0" cy="0"/>
+        </a:xfrm>
+      </p:grpSpPr>
+      <p:sp>
+        <p:nvSpPr>
+          <p:cNvPr id="2" name="Title 1"/>
+          <p:cNvSpPr>
+            <a:spLocks noGrp="1"/>
+          </p:cNvSpPr>
+          <p:nvPr>
+            <p:ph type="title"/>
+          </p:nvPr>
+        </p:nvSpPr>
+        <p:spPr/>
+        <p:txBody>
+          <a:bodyPr/>
+          <a:lstStyle/>
+          <a:p>
             <a:r>
               <a:rPr lang="en-US" dirty="0" smtClean="0"/>
               <a:t>My background</a:t>
@@ -12623,6 +13030,13 @@
   <p:clrMapOvr>
     <a:masterClrMapping/>
   </p:clrMapOvr>
+  <p:timing>
+    <p:tnLst>
+      <p:par>
+        <p:cTn id="1" dur="indefinite" restart="never" nodeType="tmRoot"/>
+      </p:par>
+    </p:tnLst>
+  </p:timing>
 </p:sld>
 </file>
 
@@ -12871,7 +13285,7 @@
   <a:extraClrSchemeLst/>
   <a:extLst>
     <a:ext uri="{05A4C25C-085E-4340-85A3-A5531E510DB2}">
-      <thm15:themeFamily xmlns:thm15="http://schemas.microsoft.com/office/thememl/2012/main" xmlns="" name="Circuit" id="{0AC2F7E7-15F5-431C-B2A2-456FE929F56C}" vid="{0911B802-464C-4241-8DD9-B60FF88E379F}"/>
+      <thm15:themeFamily xmlns="" xmlns:thm15="http://schemas.microsoft.com/office/thememl/2012/main" name="Circuit" id="{0AC2F7E7-15F5-431C-B2A2-456FE929F56C}" vid="{0911B802-464C-4241-8DD9-B60FF88E379F}"/>
     </a:ext>
   </a:extLst>
 </a:theme>

</xml_diff>